<commit_message>
Created outdoor and energy usage plots
</commit_message>
<xml_diff>
--- a/chen-SP24-capstone-35-S2.pptx
+++ b/chen-SP24-capstone-35-S2.pptx
@@ -3098,6 +3098,557 @@
           </a:p>
         </p:txBody>
       </p:sp>
+      <p:pic>
+        <p:nvPicPr>
+          <p:cNvPr id="5" name="Picture 4">
+            <a:extLst>
+              <a:ext uri="{FF2B5EF4-FFF2-40B4-BE49-F238E27FC236}">
+                <a16:creationId xmlns:a16="http://schemas.microsoft.com/office/drawing/2014/main" id="{8E16871C-651A-8546-2BB8-ADE4B99FE7B1}"/>
+              </a:ext>
+            </a:extLst>
+          </p:cNvPr>
+          <p:cNvPicPr>
+            <a:picLocks noChangeAspect="1"/>
+          </p:cNvPicPr>
+          <p:nvPr/>
+        </p:nvPicPr>
+        <p:blipFill>
+          <a:blip r:embed="rId2"/>
+          <a:stretch>
+            <a:fillRect/>
+          </a:stretch>
+        </p:blipFill>
+        <p:spPr>
+          <a:xfrm>
+            <a:off x="7315200" y="9457936"/>
+            <a:ext cx="18287999" cy="3029728"/>
+          </a:xfrm>
+          <a:prstGeom prst="rect">
+            <a:avLst/>
+          </a:prstGeom>
+        </p:spPr>
+      </p:pic>
+      <p:pic>
+        <p:nvPicPr>
+          <p:cNvPr id="10" name="Picture 9" descr="A graph of temperature&#10;&#10;Description automatically generated">
+            <a:extLst>
+              <a:ext uri="{FF2B5EF4-FFF2-40B4-BE49-F238E27FC236}">
+                <a16:creationId xmlns:a16="http://schemas.microsoft.com/office/drawing/2014/main" id="{A39F3404-BF89-A3CA-5BCE-EA44AD0DA9B2}"/>
+              </a:ext>
+            </a:extLst>
+          </p:cNvPr>
+          <p:cNvPicPr>
+            <a:picLocks noChangeAspect="1"/>
+          </p:cNvPicPr>
+          <p:nvPr/>
+        </p:nvPicPr>
+        <p:blipFill>
+          <a:blip r:embed="rId3">
+            <a:extLst>
+              <a:ext uri="{28A0092B-C50C-407E-A947-70E740481C1C}">
+                <a14:useLocalDpi xmlns:a14="http://schemas.microsoft.com/office/drawing/2010/main" val="0"/>
+              </a:ext>
+            </a:extLst>
+          </a:blip>
+          <a:stretch>
+            <a:fillRect/>
+          </a:stretch>
+        </p:blipFill>
+        <p:spPr>
+          <a:xfrm>
+            <a:off x="10307029" y="12993791"/>
+            <a:ext cx="4380521" cy="3539431"/>
+          </a:xfrm>
+          <a:prstGeom prst="rect">
+            <a:avLst/>
+          </a:prstGeom>
+          <a:ln>
+            <a:solidFill>
+              <a:schemeClr val="tx1"/>
+            </a:solidFill>
+          </a:ln>
+        </p:spPr>
+      </p:pic>
+      <p:pic>
+        <p:nvPicPr>
+          <p:cNvPr id="12" name="Picture 11" descr="A graph of a temperature&#10;&#10;Description automatically generated">
+            <a:extLst>
+              <a:ext uri="{FF2B5EF4-FFF2-40B4-BE49-F238E27FC236}">
+                <a16:creationId xmlns:a16="http://schemas.microsoft.com/office/drawing/2014/main" id="{92DC8540-877E-1793-2D79-048C4D17C201}"/>
+              </a:ext>
+            </a:extLst>
+          </p:cNvPr>
+          <p:cNvPicPr>
+            <a:picLocks noChangeAspect="1"/>
+          </p:cNvPicPr>
+          <p:nvPr/>
+        </p:nvPicPr>
+        <p:blipFill>
+          <a:blip r:embed="rId4">
+            <a:extLst>
+              <a:ext uri="{28A0092B-C50C-407E-A947-70E740481C1C}">
+                <a14:useLocalDpi xmlns:a14="http://schemas.microsoft.com/office/drawing/2010/main" val="0"/>
+              </a:ext>
+            </a:extLst>
+          </a:blip>
+          <a:stretch>
+            <a:fillRect/>
+          </a:stretch>
+        </p:blipFill>
+        <p:spPr>
+          <a:xfrm>
+            <a:off x="10680575" y="5412378"/>
+            <a:ext cx="4380521" cy="3539430"/>
+          </a:xfrm>
+          <a:prstGeom prst="rect">
+            <a:avLst/>
+          </a:prstGeom>
+          <a:ln>
+            <a:solidFill>
+              <a:schemeClr val="tx1"/>
+            </a:solidFill>
+          </a:ln>
+        </p:spPr>
+      </p:pic>
+      <p:pic>
+        <p:nvPicPr>
+          <p:cNvPr id="14" name="Picture 13" descr="A graph of temperature&#10;&#10;Description automatically generated">
+            <a:extLst>
+              <a:ext uri="{FF2B5EF4-FFF2-40B4-BE49-F238E27FC236}">
+                <a16:creationId xmlns:a16="http://schemas.microsoft.com/office/drawing/2014/main" id="{4D11697D-C654-DF68-80BA-91855991E8BA}"/>
+              </a:ext>
+            </a:extLst>
+          </p:cNvPr>
+          <p:cNvPicPr>
+            <a:picLocks noChangeAspect="1"/>
+          </p:cNvPicPr>
+          <p:nvPr/>
+        </p:nvPicPr>
+        <p:blipFill>
+          <a:blip r:embed="rId5">
+            <a:extLst>
+              <a:ext uri="{28A0092B-C50C-407E-A947-70E740481C1C}">
+                <a14:useLocalDpi xmlns:a14="http://schemas.microsoft.com/office/drawing/2010/main" val="0"/>
+              </a:ext>
+            </a:extLst>
+          </a:blip>
+          <a:stretch>
+            <a:fillRect/>
+          </a:stretch>
+        </p:blipFill>
+        <p:spPr>
+          <a:xfrm>
+            <a:off x="15567240" y="5412379"/>
+            <a:ext cx="4327238" cy="3539430"/>
+          </a:xfrm>
+          <a:prstGeom prst="rect">
+            <a:avLst/>
+          </a:prstGeom>
+          <a:ln>
+            <a:solidFill>
+              <a:schemeClr val="tx1"/>
+            </a:solidFill>
+          </a:ln>
+        </p:spPr>
+      </p:pic>
+      <p:pic>
+        <p:nvPicPr>
+          <p:cNvPr id="16" name="Picture 15" descr="A graph of a temperature&#10;&#10;Description automatically generated">
+            <a:extLst>
+              <a:ext uri="{FF2B5EF4-FFF2-40B4-BE49-F238E27FC236}">
+                <a16:creationId xmlns:a16="http://schemas.microsoft.com/office/drawing/2014/main" id="{50576046-6181-593B-1C78-0690A2DFA8FA}"/>
+              </a:ext>
+            </a:extLst>
+          </p:cNvPr>
+          <p:cNvPicPr>
+            <a:picLocks noChangeAspect="1"/>
+          </p:cNvPicPr>
+          <p:nvPr/>
+        </p:nvPicPr>
+        <p:blipFill>
+          <a:blip r:embed="rId6">
+            <a:extLst>
+              <a:ext uri="{28A0092B-C50C-407E-A947-70E740481C1C}">
+                <a14:useLocalDpi xmlns:a14="http://schemas.microsoft.com/office/drawing/2010/main" val="0"/>
+              </a:ext>
+            </a:extLst>
+          </a:blip>
+          <a:stretch>
+            <a:fillRect/>
+          </a:stretch>
+        </p:blipFill>
+        <p:spPr>
+          <a:xfrm>
+            <a:off x="19347136" y="12993791"/>
+            <a:ext cx="4380520" cy="3539429"/>
+          </a:xfrm>
+          <a:prstGeom prst="rect">
+            <a:avLst/>
+          </a:prstGeom>
+          <a:ln>
+            <a:solidFill>
+              <a:schemeClr val="tx1"/>
+            </a:solidFill>
+          </a:ln>
+        </p:spPr>
+      </p:pic>
+      <p:sp>
+        <p:nvSpPr>
+          <p:cNvPr id="23" name="Rectangle 22">
+            <a:extLst>
+              <a:ext uri="{FF2B5EF4-FFF2-40B4-BE49-F238E27FC236}">
+                <a16:creationId xmlns:a16="http://schemas.microsoft.com/office/drawing/2014/main" id="{BF51736B-E587-D693-433B-6730A7E01367}"/>
+              </a:ext>
+            </a:extLst>
+          </p:cNvPr>
+          <p:cNvSpPr/>
+          <p:nvPr/>
+        </p:nvSpPr>
+        <p:spPr>
+          <a:xfrm>
+            <a:off x="12058650" y="11461750"/>
+            <a:ext cx="279400" cy="285749"/>
+          </a:xfrm>
+          <a:prstGeom prst="rect">
+            <a:avLst/>
+          </a:prstGeom>
+        </p:spPr>
+        <p:style>
+          <a:lnRef idx="2">
+            <a:schemeClr val="dk1"/>
+          </a:lnRef>
+          <a:fillRef idx="1">
+            <a:schemeClr val="lt1"/>
+          </a:fillRef>
+          <a:effectRef idx="0">
+            <a:schemeClr val="dk1"/>
+          </a:effectRef>
+          <a:fontRef idx="minor">
+            <a:schemeClr val="dk1"/>
+          </a:fontRef>
+        </p:style>
+        <p:txBody>
+          <a:bodyPr rtlCol="0" anchor="ctr"/>
+          <a:lstStyle/>
+          <a:p>
+            <a:pPr algn="ctr"/>
+            <a:endParaRPr lang="en-US"/>
+          </a:p>
+        </p:txBody>
+      </p:sp>
+      <p:sp>
+        <p:nvSpPr>
+          <p:cNvPr id="24" name="Rectangle 23">
+            <a:extLst>
+              <a:ext uri="{FF2B5EF4-FFF2-40B4-BE49-F238E27FC236}">
+                <a16:creationId xmlns:a16="http://schemas.microsoft.com/office/drawing/2014/main" id="{0459B786-D5FD-1BEA-8190-3CECC9C3A34B}"/>
+              </a:ext>
+            </a:extLst>
+          </p:cNvPr>
+          <p:cNvSpPr/>
+          <p:nvPr/>
+        </p:nvSpPr>
+        <p:spPr>
+          <a:xfrm>
+            <a:off x="21304639" y="10562591"/>
+            <a:ext cx="267581" cy="265430"/>
+          </a:xfrm>
+          <a:prstGeom prst="rect">
+            <a:avLst/>
+          </a:prstGeom>
+        </p:spPr>
+        <p:style>
+          <a:lnRef idx="2">
+            <a:schemeClr val="dk1"/>
+          </a:lnRef>
+          <a:fillRef idx="1">
+            <a:schemeClr val="lt1"/>
+          </a:fillRef>
+          <a:effectRef idx="0">
+            <a:schemeClr val="dk1"/>
+          </a:effectRef>
+          <a:fontRef idx="minor">
+            <a:schemeClr val="dk1"/>
+          </a:fontRef>
+        </p:style>
+        <p:txBody>
+          <a:bodyPr rtlCol="0" anchor="ctr"/>
+          <a:lstStyle/>
+          <a:p>
+            <a:pPr algn="ctr"/>
+            <a:endParaRPr lang="en-US">
+              <a:solidFill>
+                <a:schemeClr val="tx1"/>
+              </a:solidFill>
+            </a:endParaRPr>
+          </a:p>
+        </p:txBody>
+      </p:sp>
+      <p:cxnSp>
+        <p:nvCxnSpPr>
+          <p:cNvPr id="26" name="Connector: Elbow 25">
+            <a:extLst>
+              <a:ext uri="{FF2B5EF4-FFF2-40B4-BE49-F238E27FC236}">
+                <a16:creationId xmlns:a16="http://schemas.microsoft.com/office/drawing/2014/main" id="{F14E63E3-6830-FC87-3CA2-E8B1B1C1A5D2}"/>
+              </a:ext>
+            </a:extLst>
+          </p:cNvPr>
+          <p:cNvCxnSpPr>
+            <a:stCxn id="24" idx="2"/>
+            <a:endCxn id="16" idx="0"/>
+          </p:cNvCxnSpPr>
+          <p:nvPr/>
+        </p:nvCxnSpPr>
+        <p:spPr>
+          <a:xfrm rot="16200000" flipH="1">
+            <a:off x="20405028" y="11861423"/>
+            <a:ext cx="2165770" cy="98966"/>
+          </a:xfrm>
+          <a:prstGeom prst="bentConnector3">
+            <a:avLst/>
+          </a:prstGeom>
+          <a:ln>
+            <a:tailEnd type="triangle"/>
+          </a:ln>
+        </p:spPr>
+        <p:style>
+          <a:lnRef idx="2">
+            <a:schemeClr val="dk1"/>
+          </a:lnRef>
+          <a:fillRef idx="0">
+            <a:schemeClr val="dk1"/>
+          </a:fillRef>
+          <a:effectRef idx="1">
+            <a:schemeClr val="dk1"/>
+          </a:effectRef>
+          <a:fontRef idx="minor">
+            <a:schemeClr val="tx1"/>
+          </a:fontRef>
+        </p:style>
+      </p:cxnSp>
+      <p:cxnSp>
+        <p:nvCxnSpPr>
+          <p:cNvPr id="28" name="Connector: Elbow 27">
+            <a:extLst>
+              <a:ext uri="{FF2B5EF4-FFF2-40B4-BE49-F238E27FC236}">
+                <a16:creationId xmlns:a16="http://schemas.microsoft.com/office/drawing/2014/main" id="{B1B69F76-D120-786F-CCA4-27E7147BB1D5}"/>
+              </a:ext>
+            </a:extLst>
+          </p:cNvPr>
+          <p:cNvCxnSpPr>
+            <a:stCxn id="23" idx="2"/>
+            <a:endCxn id="10" idx="0"/>
+          </p:cNvCxnSpPr>
+          <p:nvPr/>
+        </p:nvCxnSpPr>
+        <p:spPr>
+          <a:xfrm rot="16200000" flipH="1">
+            <a:off x="11724674" y="12221175"/>
+            <a:ext cx="1246292" cy="298940"/>
+          </a:xfrm>
+          <a:prstGeom prst="bentConnector3">
+            <a:avLst/>
+          </a:prstGeom>
+          <a:ln>
+            <a:tailEnd type="triangle"/>
+          </a:ln>
+        </p:spPr>
+        <p:style>
+          <a:lnRef idx="2">
+            <a:schemeClr val="dk1"/>
+          </a:lnRef>
+          <a:fillRef idx="0">
+            <a:schemeClr val="dk1"/>
+          </a:fillRef>
+          <a:effectRef idx="1">
+            <a:schemeClr val="dk1"/>
+          </a:effectRef>
+          <a:fontRef idx="minor">
+            <a:schemeClr val="tx1"/>
+          </a:fontRef>
+        </p:style>
+      </p:cxnSp>
+      <p:sp>
+        <p:nvSpPr>
+          <p:cNvPr id="30" name="Rectangle 29">
+            <a:extLst>
+              <a:ext uri="{FF2B5EF4-FFF2-40B4-BE49-F238E27FC236}">
+                <a16:creationId xmlns:a16="http://schemas.microsoft.com/office/drawing/2014/main" id="{CA1F4A06-617C-0870-6D78-2FAC41F4FAA7}"/>
+              </a:ext>
+            </a:extLst>
+          </p:cNvPr>
+          <p:cNvSpPr/>
+          <p:nvPr/>
+        </p:nvSpPr>
+        <p:spPr>
+          <a:xfrm>
+            <a:off x="18020419" y="11461750"/>
+            <a:ext cx="267581" cy="265430"/>
+          </a:xfrm>
+          <a:prstGeom prst="rect">
+            <a:avLst/>
+          </a:prstGeom>
+          <a:noFill/>
+        </p:spPr>
+        <p:style>
+          <a:lnRef idx="2">
+            <a:schemeClr val="dk1"/>
+          </a:lnRef>
+          <a:fillRef idx="1">
+            <a:schemeClr val="lt1"/>
+          </a:fillRef>
+          <a:effectRef idx="0">
+            <a:schemeClr val="dk1"/>
+          </a:effectRef>
+          <a:fontRef idx="minor">
+            <a:schemeClr val="dk1"/>
+          </a:fontRef>
+        </p:style>
+        <p:txBody>
+          <a:bodyPr rtlCol="0" anchor="ctr"/>
+          <a:lstStyle/>
+          <a:p>
+            <a:pPr algn="ctr"/>
+            <a:endParaRPr lang="en-US">
+              <a:solidFill>
+                <a:schemeClr val="tx1"/>
+              </a:solidFill>
+            </a:endParaRPr>
+          </a:p>
+        </p:txBody>
+      </p:sp>
+      <p:cxnSp>
+        <p:nvCxnSpPr>
+          <p:cNvPr id="32" name="Connector: Elbow 31">
+            <a:extLst>
+              <a:ext uri="{FF2B5EF4-FFF2-40B4-BE49-F238E27FC236}">
+                <a16:creationId xmlns:a16="http://schemas.microsoft.com/office/drawing/2014/main" id="{6C672636-152D-2000-C409-DB2FA5FD8B10}"/>
+              </a:ext>
+            </a:extLst>
+          </p:cNvPr>
+          <p:cNvCxnSpPr>
+            <a:stCxn id="30" idx="0"/>
+            <a:endCxn id="14" idx="2"/>
+          </p:cNvCxnSpPr>
+          <p:nvPr/>
+        </p:nvCxnSpPr>
+        <p:spPr>
+          <a:xfrm rot="16200000" flipV="1">
+            <a:off x="16687565" y="9995104"/>
+            <a:ext cx="2509941" cy="423351"/>
+          </a:xfrm>
+          <a:prstGeom prst="bentConnector3">
+            <a:avLst/>
+          </a:prstGeom>
+          <a:ln>
+            <a:solidFill>
+              <a:schemeClr val="tx1"/>
+            </a:solidFill>
+            <a:tailEnd type="triangle"/>
+          </a:ln>
+        </p:spPr>
+        <p:style>
+          <a:lnRef idx="2">
+            <a:schemeClr val="accent1"/>
+          </a:lnRef>
+          <a:fillRef idx="0">
+            <a:schemeClr val="accent1"/>
+          </a:fillRef>
+          <a:effectRef idx="1">
+            <a:schemeClr val="accent1"/>
+          </a:effectRef>
+          <a:fontRef idx="minor">
+            <a:schemeClr val="tx1"/>
+          </a:fontRef>
+        </p:style>
+      </p:cxnSp>
+      <p:sp>
+        <p:nvSpPr>
+          <p:cNvPr id="34" name="Rectangle 33">
+            <a:extLst>
+              <a:ext uri="{FF2B5EF4-FFF2-40B4-BE49-F238E27FC236}">
+                <a16:creationId xmlns:a16="http://schemas.microsoft.com/office/drawing/2014/main" id="{9633A0CD-E667-0159-5CC7-67645457D018}"/>
+              </a:ext>
+            </a:extLst>
+          </p:cNvPr>
+          <p:cNvSpPr/>
+          <p:nvPr/>
+        </p:nvSpPr>
+        <p:spPr>
+          <a:xfrm>
+            <a:off x="12653010" y="10269222"/>
+            <a:ext cx="279400" cy="285749"/>
+          </a:xfrm>
+          <a:prstGeom prst="rect">
+            <a:avLst/>
+          </a:prstGeom>
+          <a:noFill/>
+        </p:spPr>
+        <p:style>
+          <a:lnRef idx="2">
+            <a:schemeClr val="dk1"/>
+          </a:lnRef>
+          <a:fillRef idx="1">
+            <a:schemeClr val="lt1"/>
+          </a:fillRef>
+          <a:effectRef idx="0">
+            <a:schemeClr val="dk1"/>
+          </a:effectRef>
+          <a:fontRef idx="minor">
+            <a:schemeClr val="dk1"/>
+          </a:fontRef>
+        </p:style>
+        <p:txBody>
+          <a:bodyPr rtlCol="0" anchor="ctr"/>
+          <a:lstStyle/>
+          <a:p>
+            <a:pPr algn="ctr"/>
+            <a:endParaRPr lang="en-US"/>
+          </a:p>
+        </p:txBody>
+      </p:sp>
+      <p:cxnSp>
+        <p:nvCxnSpPr>
+          <p:cNvPr id="36" name="Connector: Elbow 35">
+            <a:extLst>
+              <a:ext uri="{FF2B5EF4-FFF2-40B4-BE49-F238E27FC236}">
+                <a16:creationId xmlns:a16="http://schemas.microsoft.com/office/drawing/2014/main" id="{EF56A932-E5DA-0DA9-C3A7-00B6EA779FB2}"/>
+              </a:ext>
+            </a:extLst>
+          </p:cNvPr>
+          <p:cNvCxnSpPr>
+            <a:stCxn id="34" idx="0"/>
+            <a:endCxn id="12" idx="2"/>
+          </p:cNvCxnSpPr>
+          <p:nvPr/>
+        </p:nvCxnSpPr>
+        <p:spPr>
+          <a:xfrm rot="5400000" flipH="1" flipV="1">
+            <a:off x="12173066" y="9571452"/>
+            <a:ext cx="1317414" cy="78126"/>
+          </a:xfrm>
+          <a:prstGeom prst="bentConnector3">
+            <a:avLst/>
+          </a:prstGeom>
+          <a:ln>
+            <a:tailEnd type="triangle"/>
+          </a:ln>
+        </p:spPr>
+        <p:style>
+          <a:lnRef idx="2">
+            <a:schemeClr val="dk1"/>
+          </a:lnRef>
+          <a:fillRef idx="0">
+            <a:schemeClr val="dk1"/>
+          </a:fillRef>
+          <a:effectRef idx="1">
+            <a:schemeClr val="dk1"/>
+          </a:effectRef>
+          <a:fontRef idx="minor">
+            <a:schemeClr val="tx1"/>
+          </a:fontRef>
+        </p:style>
+      </p:cxnSp>
     </p:spTree>
     <p:extLst>
       <p:ext uri="{BB962C8B-B14F-4D97-AF65-F5344CB8AC3E}">

</xml_diff>

<commit_message>
added alternative location visualizations
</commit_message>
<xml_diff>
--- a/chen-SP24-capstone-35-S2.pptx
+++ b/chen-SP24-capstone-35-S2.pptx
@@ -259,7 +259,7 @@
           <a:p>
             <a:fld id="{FD67BBB0-9CCF-44CC-A83F-B19183C7913C}" type="datetimeFigureOut">
               <a:rPr lang="en-US" smtClean="0"/>
-              <a:t>4/16/2024</a:t>
+              <a:t>4/17/2024</a:t>
             </a:fld>
             <a:endParaRPr lang="en-US"/>
           </a:p>
@@ -429,7 +429,7 @@
           <a:p>
             <a:fld id="{FD67BBB0-9CCF-44CC-A83F-B19183C7913C}" type="datetimeFigureOut">
               <a:rPr lang="en-US" smtClean="0"/>
-              <a:t>4/16/2024</a:t>
+              <a:t>4/17/2024</a:t>
             </a:fld>
             <a:endParaRPr lang="en-US"/>
           </a:p>
@@ -609,7 +609,7 @@
           <a:p>
             <a:fld id="{FD67BBB0-9CCF-44CC-A83F-B19183C7913C}" type="datetimeFigureOut">
               <a:rPr lang="en-US" smtClean="0"/>
-              <a:t>4/16/2024</a:t>
+              <a:t>4/17/2024</a:t>
             </a:fld>
             <a:endParaRPr lang="en-US"/>
           </a:p>
@@ -779,7 +779,7 @@
           <a:p>
             <a:fld id="{FD67BBB0-9CCF-44CC-A83F-B19183C7913C}" type="datetimeFigureOut">
               <a:rPr lang="en-US" smtClean="0"/>
-              <a:t>4/16/2024</a:t>
+              <a:t>4/17/2024</a:t>
             </a:fld>
             <a:endParaRPr lang="en-US"/>
           </a:p>
@@ -1025,7 +1025,7 @@
           <a:p>
             <a:fld id="{FD67BBB0-9CCF-44CC-A83F-B19183C7913C}" type="datetimeFigureOut">
               <a:rPr lang="en-US" smtClean="0"/>
-              <a:t>4/16/2024</a:t>
+              <a:t>4/17/2024</a:t>
             </a:fld>
             <a:endParaRPr lang="en-US"/>
           </a:p>
@@ -1257,7 +1257,7 @@
           <a:p>
             <a:fld id="{FD67BBB0-9CCF-44CC-A83F-B19183C7913C}" type="datetimeFigureOut">
               <a:rPr lang="en-US" smtClean="0"/>
-              <a:t>4/16/2024</a:t>
+              <a:t>4/17/2024</a:t>
             </a:fld>
             <a:endParaRPr lang="en-US"/>
           </a:p>
@@ -1624,7 +1624,7 @@
           <a:p>
             <a:fld id="{FD67BBB0-9CCF-44CC-A83F-B19183C7913C}" type="datetimeFigureOut">
               <a:rPr lang="en-US" smtClean="0"/>
-              <a:t>4/16/2024</a:t>
+              <a:t>4/17/2024</a:t>
             </a:fld>
             <a:endParaRPr lang="en-US"/>
           </a:p>
@@ -1742,7 +1742,7 @@
           <a:p>
             <a:fld id="{FD67BBB0-9CCF-44CC-A83F-B19183C7913C}" type="datetimeFigureOut">
               <a:rPr lang="en-US" smtClean="0"/>
-              <a:t>4/16/2024</a:t>
+              <a:t>4/17/2024</a:t>
             </a:fld>
             <a:endParaRPr lang="en-US"/>
           </a:p>
@@ -1837,7 +1837,7 @@
           <a:p>
             <a:fld id="{FD67BBB0-9CCF-44CC-A83F-B19183C7913C}" type="datetimeFigureOut">
               <a:rPr lang="en-US" smtClean="0"/>
-              <a:t>4/16/2024</a:t>
+              <a:t>4/17/2024</a:t>
             </a:fld>
             <a:endParaRPr lang="en-US"/>
           </a:p>
@@ -2114,7 +2114,7 @@
           <a:p>
             <a:fld id="{FD67BBB0-9CCF-44CC-A83F-B19183C7913C}" type="datetimeFigureOut">
               <a:rPr lang="en-US" smtClean="0"/>
-              <a:t>4/16/2024</a:t>
+              <a:t>4/17/2024</a:t>
             </a:fld>
             <a:endParaRPr lang="en-US"/>
           </a:p>
@@ -2371,7 +2371,7 @@
           <a:p>
             <a:fld id="{FD67BBB0-9CCF-44CC-A83F-B19183C7913C}" type="datetimeFigureOut">
               <a:rPr lang="en-US" smtClean="0"/>
-              <a:t>4/16/2024</a:t>
+              <a:t>4/17/2024</a:t>
             </a:fld>
             <a:endParaRPr lang="en-US"/>
           </a:p>
@@ -2584,7 +2584,7 @@
           <a:p>
             <a:fld id="{FD67BBB0-9CCF-44CC-A83F-B19183C7913C}" type="datetimeFigureOut">
               <a:rPr lang="en-US" smtClean="0"/>
-              <a:t>4/16/2024</a:t>
+              <a:t>4/17/2024</a:t>
             </a:fld>
             <a:endParaRPr lang="en-US"/>
           </a:p>
@@ -3120,7 +3120,7 @@
         </p:blipFill>
         <p:spPr>
           <a:xfrm>
-            <a:off x="7315200" y="9457936"/>
+            <a:off x="7315200" y="8460412"/>
             <a:ext cx="18287999" cy="3029728"/>
           </a:xfrm>
           <a:prstGeom prst="rect">
@@ -3130,7 +3130,7 @@
       </p:pic>
       <p:pic>
         <p:nvPicPr>
-          <p:cNvPr id="10" name="Picture 9" descr="A graph of temperature&#10;&#10;Description automatically generated">
+          <p:cNvPr id="10" name="Picture 9">
             <a:extLst>
               <a:ext uri="{FF2B5EF4-FFF2-40B4-BE49-F238E27FC236}">
                 <a16:creationId xmlns:a16="http://schemas.microsoft.com/office/drawing/2014/main" id="{A39F3404-BF89-A3CA-5BCE-EA44AD0DA9B2}"/>
@@ -3150,14 +3150,13 @@
               </a:ext>
             </a:extLst>
           </a:blip>
-          <a:stretch>
-            <a:fillRect/>
-          </a:stretch>
+          <a:srcRect/>
+          <a:stretch/>
         </p:blipFill>
         <p:spPr>
           <a:xfrm>
-            <a:off x="10307029" y="12993791"/>
-            <a:ext cx="4380521" cy="3539431"/>
+            <a:off x="10748764" y="12039501"/>
+            <a:ext cx="4560924" cy="3685757"/>
           </a:xfrm>
           <a:prstGeom prst="rect">
             <a:avLst/>
@@ -3171,7 +3170,7 @@
       </p:pic>
       <p:pic>
         <p:nvPicPr>
-          <p:cNvPr id="12" name="Picture 11" descr="A graph of a temperature&#10;&#10;Description automatically generated">
+          <p:cNvPr id="12" name="Picture 11">
             <a:extLst>
               <a:ext uri="{FF2B5EF4-FFF2-40B4-BE49-F238E27FC236}">
                 <a16:creationId xmlns:a16="http://schemas.microsoft.com/office/drawing/2014/main" id="{92DC8540-877E-1793-2D79-048C4D17C201}"/>
@@ -3191,14 +3190,13 @@
               </a:ext>
             </a:extLst>
           </a:blip>
-          <a:stretch>
-            <a:fillRect/>
-          </a:stretch>
+          <a:srcRect/>
+          <a:stretch/>
         </p:blipFill>
         <p:spPr>
           <a:xfrm>
-            <a:off x="10680575" y="5412378"/>
-            <a:ext cx="4380521" cy="3539430"/>
+            <a:off x="10686003" y="4452545"/>
+            <a:ext cx="4560924" cy="3685756"/>
           </a:xfrm>
           <a:prstGeom prst="rect">
             <a:avLst/>
@@ -3212,7 +3210,7 @@
       </p:pic>
       <p:pic>
         <p:nvPicPr>
-          <p:cNvPr id="14" name="Picture 13" descr="A graph of temperature&#10;&#10;Description automatically generated">
+          <p:cNvPr id="14" name="Picture 13">
             <a:extLst>
               <a:ext uri="{FF2B5EF4-FFF2-40B4-BE49-F238E27FC236}">
                 <a16:creationId xmlns:a16="http://schemas.microsoft.com/office/drawing/2014/main" id="{4D11697D-C654-DF68-80BA-91855991E8BA}"/>
@@ -3232,14 +3230,13 @@
               </a:ext>
             </a:extLst>
           </a:blip>
-          <a:stretch>
-            <a:fillRect/>
-          </a:stretch>
+          <a:srcRect/>
+          <a:stretch/>
         </p:blipFill>
         <p:spPr>
           <a:xfrm>
-            <a:off x="15567240" y="5412379"/>
-            <a:ext cx="4327238" cy="3539430"/>
+            <a:off x="18388951" y="4452545"/>
+            <a:ext cx="4560924" cy="3728989"/>
           </a:xfrm>
           <a:prstGeom prst="rect">
             <a:avLst/>
@@ -3253,7 +3250,7 @@
       </p:pic>
       <p:pic>
         <p:nvPicPr>
-          <p:cNvPr id="16" name="Picture 15" descr="A graph of a temperature&#10;&#10;Description automatically generated">
+          <p:cNvPr id="16" name="Picture 15">
             <a:extLst>
               <a:ext uri="{FF2B5EF4-FFF2-40B4-BE49-F238E27FC236}">
                 <a16:creationId xmlns:a16="http://schemas.microsoft.com/office/drawing/2014/main" id="{50576046-6181-593B-1C78-0690A2DFA8FA}"/>
@@ -3273,14 +3270,13 @@
               </a:ext>
             </a:extLst>
           </a:blip>
-          <a:stretch>
-            <a:fillRect/>
-          </a:stretch>
+          <a:srcRect/>
+          <a:stretch/>
         </p:blipFill>
         <p:spPr>
           <a:xfrm>
-            <a:off x="19347136" y="12993791"/>
-            <a:ext cx="4380520" cy="3539429"/>
+            <a:off x="18421348" y="12039501"/>
+            <a:ext cx="4560924" cy="3685757"/>
           </a:xfrm>
           <a:prstGeom prst="rect">
             <a:avLst/>
@@ -3306,7 +3302,7 @@
         </p:nvSpPr>
         <p:spPr>
           <a:xfrm>
-            <a:off x="12058650" y="11461750"/>
+            <a:off x="12058650" y="10464226"/>
             <a:ext cx="279400" cy="285749"/>
           </a:xfrm>
           <a:prstGeom prst="rect">
@@ -3350,7 +3346,7 @@
         </p:nvSpPr>
         <p:spPr>
           <a:xfrm>
-            <a:off x="21304639" y="10562591"/>
+            <a:off x="21304639" y="9565067"/>
             <a:ext cx="267581" cy="265430"/>
           </a:xfrm>
           <a:prstGeom prst="rect">
@@ -3394,15 +3390,16 @@
             </a:extLst>
           </p:cNvPr>
           <p:cNvCxnSpPr>
+            <a:cxnSpLocks/>
             <a:stCxn id="24" idx="2"/>
             <a:endCxn id="16" idx="0"/>
           </p:cNvCxnSpPr>
           <p:nvPr/>
         </p:nvCxnSpPr>
         <p:spPr>
-          <a:xfrm rot="16200000" flipH="1">
-            <a:off x="20405028" y="11861423"/>
-            <a:ext cx="2165770" cy="98966"/>
+          <a:xfrm rot="5400000">
+            <a:off x="19965618" y="10566689"/>
+            <a:ext cx="2209004" cy="736620"/>
           </a:xfrm>
           <a:prstGeom prst="bentConnector3">
             <a:avLst/>
@@ -3436,6 +3433,7 @@
             </a:extLst>
           </p:cNvPr>
           <p:cNvCxnSpPr>
+            <a:cxnSpLocks/>
             <a:stCxn id="23" idx="2"/>
             <a:endCxn id="10" idx="0"/>
           </p:cNvCxnSpPr>
@@ -3443,8 +3441,195 @@
         </p:nvCxnSpPr>
         <p:spPr>
           <a:xfrm rot="16200000" flipH="1">
-            <a:off x="11724674" y="12221175"/>
-            <a:ext cx="1246292" cy="298940"/>
+            <a:off x="11969025" y="10979300"/>
+            <a:ext cx="1289526" cy="830876"/>
+          </a:xfrm>
+          <a:prstGeom prst="bentConnector3">
+            <a:avLst>
+              <a:gd name="adj1" fmla="val 50000"/>
+            </a:avLst>
+          </a:prstGeom>
+          <a:ln>
+            <a:tailEnd type="triangle"/>
+          </a:ln>
+        </p:spPr>
+        <p:style>
+          <a:lnRef idx="2">
+            <a:schemeClr val="dk1"/>
+          </a:lnRef>
+          <a:fillRef idx="0">
+            <a:schemeClr val="dk1"/>
+          </a:fillRef>
+          <a:effectRef idx="1">
+            <a:schemeClr val="dk1"/>
+          </a:effectRef>
+          <a:fontRef idx="minor">
+            <a:schemeClr val="tx1"/>
+          </a:fontRef>
+        </p:style>
+      </p:cxnSp>
+      <p:sp>
+        <p:nvSpPr>
+          <p:cNvPr id="30" name="Rectangle 29">
+            <a:extLst>
+              <a:ext uri="{FF2B5EF4-FFF2-40B4-BE49-F238E27FC236}">
+                <a16:creationId xmlns:a16="http://schemas.microsoft.com/office/drawing/2014/main" id="{CA1F4A06-617C-0870-6D78-2FAC41F4FAA7}"/>
+              </a:ext>
+            </a:extLst>
+          </p:cNvPr>
+          <p:cNvSpPr/>
+          <p:nvPr/>
+        </p:nvSpPr>
+        <p:spPr>
+          <a:xfrm>
+            <a:off x="18020419" y="10464226"/>
+            <a:ext cx="267581" cy="265430"/>
+          </a:xfrm>
+          <a:prstGeom prst="rect">
+            <a:avLst/>
+          </a:prstGeom>
+          <a:noFill/>
+        </p:spPr>
+        <p:style>
+          <a:lnRef idx="2">
+            <a:schemeClr val="dk1"/>
+          </a:lnRef>
+          <a:fillRef idx="1">
+            <a:schemeClr val="lt1"/>
+          </a:fillRef>
+          <a:effectRef idx="0">
+            <a:schemeClr val="dk1"/>
+          </a:effectRef>
+          <a:fontRef idx="minor">
+            <a:schemeClr val="dk1"/>
+          </a:fontRef>
+        </p:style>
+        <p:txBody>
+          <a:bodyPr rtlCol="0" anchor="ctr"/>
+          <a:lstStyle/>
+          <a:p>
+            <a:pPr algn="ctr"/>
+            <a:endParaRPr lang="en-US">
+              <a:solidFill>
+                <a:schemeClr val="tx1"/>
+              </a:solidFill>
+            </a:endParaRPr>
+          </a:p>
+        </p:txBody>
+      </p:sp>
+      <p:cxnSp>
+        <p:nvCxnSpPr>
+          <p:cNvPr id="32" name="Connector: Elbow 31">
+            <a:extLst>
+              <a:ext uri="{FF2B5EF4-FFF2-40B4-BE49-F238E27FC236}">
+                <a16:creationId xmlns:a16="http://schemas.microsoft.com/office/drawing/2014/main" id="{6C672636-152D-2000-C409-DB2FA5FD8B10}"/>
+              </a:ext>
+            </a:extLst>
+          </p:cNvPr>
+          <p:cNvCxnSpPr>
+            <a:cxnSpLocks/>
+            <a:stCxn id="30" idx="0"/>
+            <a:endCxn id="14" idx="2"/>
+          </p:cNvCxnSpPr>
+          <p:nvPr/>
+        </p:nvCxnSpPr>
+        <p:spPr>
+          <a:xfrm rot="5400000" flipH="1" flipV="1">
+            <a:off x="18270465" y="8065279"/>
+            <a:ext cx="2282692" cy="2515203"/>
+          </a:xfrm>
+          <a:prstGeom prst="bentConnector3">
+            <a:avLst>
+              <a:gd name="adj1" fmla="val 50000"/>
+            </a:avLst>
+          </a:prstGeom>
+          <a:ln>
+            <a:solidFill>
+              <a:schemeClr val="tx1"/>
+            </a:solidFill>
+            <a:tailEnd type="triangle"/>
+          </a:ln>
+        </p:spPr>
+        <p:style>
+          <a:lnRef idx="2">
+            <a:schemeClr val="accent1"/>
+          </a:lnRef>
+          <a:fillRef idx="0">
+            <a:schemeClr val="accent1"/>
+          </a:fillRef>
+          <a:effectRef idx="1">
+            <a:schemeClr val="accent1"/>
+          </a:effectRef>
+          <a:fontRef idx="minor">
+            <a:schemeClr val="tx1"/>
+          </a:fontRef>
+        </p:style>
+      </p:cxnSp>
+      <p:sp>
+        <p:nvSpPr>
+          <p:cNvPr id="34" name="Rectangle 33">
+            <a:extLst>
+              <a:ext uri="{FF2B5EF4-FFF2-40B4-BE49-F238E27FC236}">
+                <a16:creationId xmlns:a16="http://schemas.microsoft.com/office/drawing/2014/main" id="{9633A0CD-E667-0159-5CC7-67645457D018}"/>
+              </a:ext>
+            </a:extLst>
+          </p:cNvPr>
+          <p:cNvSpPr/>
+          <p:nvPr/>
+        </p:nvSpPr>
+        <p:spPr>
+          <a:xfrm>
+            <a:off x="12653010" y="9271698"/>
+            <a:ext cx="279400" cy="285749"/>
+          </a:xfrm>
+          <a:prstGeom prst="rect">
+            <a:avLst/>
+          </a:prstGeom>
+          <a:noFill/>
+        </p:spPr>
+        <p:style>
+          <a:lnRef idx="2">
+            <a:schemeClr val="dk1"/>
+          </a:lnRef>
+          <a:fillRef idx="1">
+            <a:schemeClr val="lt1"/>
+          </a:fillRef>
+          <a:effectRef idx="0">
+            <a:schemeClr val="dk1"/>
+          </a:effectRef>
+          <a:fontRef idx="minor">
+            <a:schemeClr val="dk1"/>
+          </a:fontRef>
+        </p:style>
+        <p:txBody>
+          <a:bodyPr rtlCol="0" anchor="ctr"/>
+          <a:lstStyle/>
+          <a:p>
+            <a:pPr algn="ctr"/>
+            <a:endParaRPr lang="en-US"/>
+          </a:p>
+        </p:txBody>
+      </p:sp>
+      <p:cxnSp>
+        <p:nvCxnSpPr>
+          <p:cNvPr id="36" name="Connector: Elbow 35">
+            <a:extLst>
+              <a:ext uri="{FF2B5EF4-FFF2-40B4-BE49-F238E27FC236}">
+                <a16:creationId xmlns:a16="http://schemas.microsoft.com/office/drawing/2014/main" id="{EF56A932-E5DA-0DA9-C3A7-00B6EA779FB2}"/>
+              </a:ext>
+            </a:extLst>
+          </p:cNvPr>
+          <p:cNvCxnSpPr>
+            <a:cxnSpLocks/>
+            <a:stCxn id="34" idx="0"/>
+            <a:endCxn id="12" idx="2"/>
+          </p:cNvCxnSpPr>
+          <p:nvPr/>
+        </p:nvCxnSpPr>
+        <p:spPr>
+          <a:xfrm rot="5400000" flipH="1" flipV="1">
+            <a:off x="12312889" y="8618123"/>
+            <a:ext cx="1133397" cy="173755"/>
           </a:xfrm>
           <a:prstGeom prst="bentConnector3">
             <a:avLst/>
@@ -3468,187 +3653,129 @@
           </a:fontRef>
         </p:style>
       </p:cxnSp>
-      <p:sp>
-        <p:nvSpPr>
-          <p:cNvPr id="30" name="Rectangle 29">
+      <p:pic>
+        <p:nvPicPr>
+          <p:cNvPr id="22" name="Picture 21" descr="A graph showing the effect of outdoor temperature on energy usage and indoor temperature&#10;&#10;Description automatically generated">
             <a:extLst>
               <a:ext uri="{FF2B5EF4-FFF2-40B4-BE49-F238E27FC236}">
-                <a16:creationId xmlns:a16="http://schemas.microsoft.com/office/drawing/2014/main" id="{CA1F4A06-617C-0870-6D78-2FAC41F4FAA7}"/>
+                <a16:creationId xmlns:a16="http://schemas.microsoft.com/office/drawing/2014/main" id="{C2B86357-5194-F929-74CD-EC94D90FF798}"/>
               </a:ext>
             </a:extLst>
           </p:cNvPr>
-          <p:cNvSpPr/>
+          <p:cNvPicPr>
+            <a:picLocks noChangeAspect="1"/>
+          </p:cNvPicPr>
           <p:nvPr/>
-        </p:nvSpPr>
+        </p:nvPicPr>
+        <p:blipFill>
+          <a:blip r:embed="rId7">
+            <a:extLst>
+              <a:ext uri="{28A0092B-C50C-407E-A947-70E740481C1C}">
+                <a14:useLocalDpi xmlns:a14="http://schemas.microsoft.com/office/drawing/2010/main" val="0"/>
+              </a:ext>
+            </a:extLst>
+          </a:blip>
+          <a:stretch>
+            <a:fillRect/>
+          </a:stretch>
+        </p:blipFill>
         <p:spPr>
           <a:xfrm>
-            <a:off x="18020419" y="11461750"/>
-            <a:ext cx="267581" cy="265430"/>
+            <a:off x="19232797" y="17493055"/>
+            <a:ext cx="5562424" cy="4125974"/>
           </a:xfrm>
           <a:prstGeom prst="rect">
-            <a:avLst/>
-          </a:prstGeom>
-          <a:noFill/>
-        </p:spPr>
-        <p:style>
-          <a:lnRef idx="2">
-            <a:schemeClr val="dk1"/>
-          </a:lnRef>
-          <a:fillRef idx="1">
-            <a:schemeClr val="lt1"/>
-          </a:fillRef>
-          <a:effectRef idx="0">
-            <a:schemeClr val="dk1"/>
-          </a:effectRef>
-          <a:fontRef idx="minor">
-            <a:schemeClr val="dk1"/>
-          </a:fontRef>
-        </p:style>
-        <p:txBody>
-          <a:bodyPr rtlCol="0" anchor="ctr"/>
-          <a:lstStyle/>
-          <a:p>
-            <a:pPr algn="ctr"/>
-            <a:endParaRPr lang="en-US">
-              <a:solidFill>
-                <a:schemeClr val="tx1"/>
-              </a:solidFill>
-            </a:endParaRPr>
-          </a:p>
-        </p:txBody>
-      </p:sp>
-      <p:cxnSp>
-        <p:nvCxnSpPr>
-          <p:cNvPr id="32" name="Connector: Elbow 31">
-            <a:extLst>
-              <a:ext uri="{FF2B5EF4-FFF2-40B4-BE49-F238E27FC236}">
-                <a16:creationId xmlns:a16="http://schemas.microsoft.com/office/drawing/2014/main" id="{6C672636-152D-2000-C409-DB2FA5FD8B10}"/>
-              </a:ext>
-            </a:extLst>
-          </p:cNvPr>
-          <p:cNvCxnSpPr>
-            <a:stCxn id="30" idx="0"/>
-            <a:endCxn id="14" idx="2"/>
-          </p:cNvCxnSpPr>
-          <p:nvPr/>
-        </p:nvCxnSpPr>
-        <p:spPr>
-          <a:xfrm rot="16200000" flipV="1">
-            <a:off x="16687565" y="9995104"/>
-            <a:ext cx="2509941" cy="423351"/>
-          </a:xfrm>
-          <a:prstGeom prst="bentConnector3">
             <a:avLst/>
           </a:prstGeom>
           <a:ln>
             <a:solidFill>
               <a:schemeClr val="tx1"/>
             </a:solidFill>
-            <a:tailEnd type="triangle"/>
           </a:ln>
         </p:spPr>
-        <p:style>
-          <a:lnRef idx="2">
-            <a:schemeClr val="accent1"/>
-          </a:lnRef>
-          <a:fillRef idx="0">
-            <a:schemeClr val="accent1"/>
-          </a:fillRef>
-          <a:effectRef idx="1">
-            <a:schemeClr val="accent1"/>
-          </a:effectRef>
-          <a:fontRef idx="minor">
-            <a:schemeClr val="tx1"/>
-          </a:fontRef>
-        </p:style>
-      </p:cxnSp>
-      <p:sp>
-        <p:nvSpPr>
-          <p:cNvPr id="34" name="Rectangle 33">
+      </p:pic>
+      <p:pic>
+        <p:nvPicPr>
+          <p:cNvPr id="27" name="Picture 26" descr="A graph showing the temperature of the year&#10;&#10;Description automatically generated">
             <a:extLst>
               <a:ext uri="{FF2B5EF4-FFF2-40B4-BE49-F238E27FC236}">
-                <a16:creationId xmlns:a16="http://schemas.microsoft.com/office/drawing/2014/main" id="{9633A0CD-E667-0159-5CC7-67645457D018}"/>
+                <a16:creationId xmlns:a16="http://schemas.microsoft.com/office/drawing/2014/main" id="{EB6B38E9-4167-30CD-51FF-0E773D0F15C9}"/>
               </a:ext>
             </a:extLst>
           </p:cNvPr>
-          <p:cNvSpPr/>
+          <p:cNvPicPr>
+            <a:picLocks noChangeAspect="1"/>
+          </p:cNvPicPr>
           <p:nvPr/>
-        </p:nvSpPr>
+        </p:nvPicPr>
+        <p:blipFill>
+          <a:blip r:embed="rId8">
+            <a:extLst>
+              <a:ext uri="{28A0092B-C50C-407E-A947-70E740481C1C}">
+                <a14:useLocalDpi xmlns:a14="http://schemas.microsoft.com/office/drawing/2010/main" val="0"/>
+              </a:ext>
+            </a:extLst>
+          </a:blip>
+          <a:stretch>
+            <a:fillRect/>
+          </a:stretch>
+        </p:blipFill>
         <p:spPr>
           <a:xfrm>
-            <a:off x="12653010" y="10269222"/>
-            <a:ext cx="279400" cy="285749"/>
+            <a:off x="8272884" y="17493055"/>
+            <a:ext cx="4951760" cy="4125974"/>
           </a:xfrm>
           <a:prstGeom prst="rect">
             <a:avLst/>
           </a:prstGeom>
-          <a:noFill/>
+          <a:ln>
+            <a:solidFill>
+              <a:schemeClr val="tx1"/>
+            </a:solidFill>
+          </a:ln>
         </p:spPr>
-        <p:style>
-          <a:lnRef idx="2">
-            <a:schemeClr val="dk1"/>
-          </a:lnRef>
-          <a:fillRef idx="1">
-            <a:schemeClr val="lt1"/>
-          </a:fillRef>
-          <a:effectRef idx="0">
-            <a:schemeClr val="dk1"/>
-          </a:effectRef>
-          <a:fontRef idx="minor">
-            <a:schemeClr val="dk1"/>
-          </a:fontRef>
-        </p:style>
-        <p:txBody>
-          <a:bodyPr rtlCol="0" anchor="ctr"/>
-          <a:lstStyle/>
-          <a:p>
-            <a:pPr algn="ctr"/>
-            <a:endParaRPr lang="en-US"/>
-          </a:p>
-        </p:txBody>
-      </p:sp>
-      <p:cxnSp>
-        <p:nvCxnSpPr>
-          <p:cNvPr id="36" name="Connector: Elbow 35">
+      </p:pic>
+      <p:pic>
+        <p:nvPicPr>
+          <p:cNvPr id="31" name="Picture 30" descr="A graph showing the amount of energy usage&#10;&#10;Description automatically generated">
             <a:extLst>
               <a:ext uri="{FF2B5EF4-FFF2-40B4-BE49-F238E27FC236}">
-                <a16:creationId xmlns:a16="http://schemas.microsoft.com/office/drawing/2014/main" id="{EF56A932-E5DA-0DA9-C3A7-00B6EA779FB2}"/>
+                <a16:creationId xmlns:a16="http://schemas.microsoft.com/office/drawing/2014/main" id="{DE146C63-6A5C-583C-1FAD-2F1C1D3FE42A}"/>
               </a:ext>
             </a:extLst>
           </p:cNvPr>
-          <p:cNvCxnSpPr>
-            <a:stCxn id="34" idx="0"/>
-            <a:endCxn id="12" idx="2"/>
-          </p:cNvCxnSpPr>
+          <p:cNvPicPr>
+            <a:picLocks noChangeAspect="1"/>
+          </p:cNvPicPr>
           <p:nvPr/>
-        </p:nvCxnSpPr>
+        </p:nvPicPr>
+        <p:blipFill>
+          <a:blip r:embed="rId9">
+            <a:extLst>
+              <a:ext uri="{28A0092B-C50C-407E-A947-70E740481C1C}">
+                <a14:useLocalDpi xmlns:a14="http://schemas.microsoft.com/office/drawing/2010/main" val="0"/>
+              </a:ext>
+            </a:extLst>
+          </a:blip>
+          <a:stretch>
+            <a:fillRect/>
+          </a:stretch>
+        </p:blipFill>
         <p:spPr>
-          <a:xfrm rot="5400000" flipH="1" flipV="1">
-            <a:off x="12173066" y="9571452"/>
-            <a:ext cx="1317414" cy="78126"/>
+          <a:xfrm>
+            <a:off x="13752840" y="17493055"/>
+            <a:ext cx="4951761" cy="4125974"/>
           </a:xfrm>
-          <a:prstGeom prst="bentConnector3">
+          <a:prstGeom prst="rect">
             <a:avLst/>
           </a:prstGeom>
           <a:ln>
-            <a:tailEnd type="triangle"/>
+            <a:solidFill>
+              <a:schemeClr val="tx1"/>
+            </a:solidFill>
           </a:ln>
         </p:spPr>
-        <p:style>
-          <a:lnRef idx="2">
-            <a:schemeClr val="dk1"/>
-          </a:lnRef>
-          <a:fillRef idx="0">
-            <a:schemeClr val="dk1"/>
-          </a:fillRef>
-          <a:effectRef idx="1">
-            <a:schemeClr val="dk1"/>
-          </a:effectRef>
-          <a:fontRef idx="minor">
-            <a:schemeClr val="tx1"/>
-          </a:fontRef>
-        </p:style>
-      </p:cxnSp>
+      </p:pic>
     </p:spTree>
     <p:extLst>
       <p:ext uri="{BB962C8B-B14F-4D97-AF65-F5344CB8AC3E}">

</xml_diff>